<commit_message>
添加ch03-2 pdf 更新ch03-2 ppt
</commit_message>
<xml_diff>
--- a/materials/slides/ch03-2.pptx
+++ b/materials/slides/ch03-2.pptx
@@ -17418,7 +17418,12 @@
             <p:ph sz="quarter" idx="1"/>
           </p:nvPr>
         </p:nvSpPr>
-        <p:spPr/>
+        <p:spPr>
+          <a:xfrm>
+            <a:off x="393700" y="1489075"/>
+            <a:ext cx="10714355" cy="4313555"/>
+          </a:xfrm>
+        </p:spPr>
         <p:txBody>
           <a:bodyPr/>
           <a:lstStyle/>
@@ -17480,7 +17485,17 @@
             </a:r>
             <a:r>
               <a:rPr lang="zh-CN" altLang="en-US" sz="2400" dirty="0"/>
-              <a:t>，例如编码结束前</a:t>
+              <a:t>，</a:t>
+            </a:r>
+            <a:r>
+              <a:rPr lang="zh-CN" altLang="en-US" sz="2400" dirty="0">
+                <a:sym typeface="+mn-ea"/>
+              </a:rPr>
+              <a:t>可在依赖关系中加入时间提前量或滞后量，来更准确地表示活动间的逻辑关系。</a:t>
+            </a:r>
+            <a:r>
+              <a:rPr lang="zh-CN" altLang="en-US" sz="2400" dirty="0"/>
+              <a:t>例如编码结束前</a:t>
             </a:r>
             <a:r>
               <a:rPr lang="en-US" altLang="zh-CN" sz="2400" dirty="0"/>
@@ -17488,7 +17503,16 @@
             </a:r>
             <a:r>
               <a:rPr lang="zh-CN" altLang="en-US" sz="2400" dirty="0"/>
-              <a:t>天就开始测试；</a:t>
+              <a:t>天就开始发布前的测试</a:t>
+            </a:r>
+            <a:endParaRPr lang="zh-CN" altLang="en-US" sz="2400" dirty="0"/>
+          </a:p>
+          <a:p>
+            <a:r>
+              <a:rPr lang="zh-CN" altLang="en-US" sz="2400" dirty="0">
+                <a:sym typeface="+mn-ea"/>
+              </a:rPr>
+              <a:t>进度网络模板。可以使用企业标准的网络图模板，来加快项目活动网络图的编制速度</a:t>
             </a:r>
             <a:endParaRPr lang="en-US" altLang="zh-CN" sz="2400" dirty="0"/>
           </a:p>
@@ -17996,6 +18020,67 @@
                                           <p:spTgt spid="3">
                                             <p:txEl>
                                               <p:pRg st="4" end="4"/>
+                                            </p:txEl>
+                                          </p:spTgt>
+                                        </p:tgtEl>
+                                      </p:cBhvr>
+                                    </p:animEffect>
+                                  </p:childTnLst>
+                                </p:cTn>
+                              </p:par>
+                            </p:childTnLst>
+                          </p:cTn>
+                        </p:par>
+                      </p:childTnLst>
+                    </p:cTn>
+                  </p:par>
+                  <p:par>
+                    <p:cTn id="33" fill="hold">
+                      <p:stCondLst>
+                        <p:cond delay="indefinite"/>
+                      </p:stCondLst>
+                      <p:childTnLst>
+                        <p:par>
+                          <p:cTn id="34" fill="hold">
+                            <p:stCondLst>
+                              <p:cond delay="0"/>
+                            </p:stCondLst>
+                            <p:childTnLst>
+                              <p:par>
+                                <p:cTn id="35" presetID="3" presetClass="entr" presetSubtype="10" fill="hold" grpId="0" nodeType="clickEffect">
+                                  <p:stCondLst>
+                                    <p:cond delay="0"/>
+                                  </p:stCondLst>
+                                  <p:childTnLst>
+                                    <p:set>
+                                      <p:cBhvr>
+                                        <p:cTn id="36" dur="1" fill="hold">
+                                          <p:stCondLst>
+                                            <p:cond delay="0"/>
+                                          </p:stCondLst>
+                                        </p:cTn>
+                                        <p:tgtEl>
+                                          <p:spTgt spid="3">
+                                            <p:txEl>
+                                              <p:pRg st="5" end="5"/>
+                                            </p:txEl>
+                                          </p:spTgt>
+                                        </p:tgtEl>
+                                        <p:attrNameLst>
+                                          <p:attrName>style.visibility</p:attrName>
+                                        </p:attrNameLst>
+                                      </p:cBhvr>
+                                      <p:to>
+                                        <p:strVal val="visible"/>
+                                      </p:to>
+                                    </p:set>
+                                    <p:animEffect transition="in" filter="blinds(horizontal)">
+                                      <p:cBhvr>
+                                        <p:cTn id="37" dur="500"/>
+                                        <p:tgtEl>
+                                          <p:spTgt spid="3">
+                                            <p:txEl>
+                                              <p:pRg st="5" end="5"/>
                                             </p:txEl>
                                           </p:spTgt>
                                         </p:tgtEl>

</xml_diff>